<commit_message>
Cleanup - Moved misc (looks like junk) items to TBD folder
</commit_message>
<xml_diff>
--- a/carl/NU-FinalProject_Stocks.pptx
+++ b/carl/NU-FinalProject_Stocks.pptx
@@ -171,7 +171,7 @@
 <file path=ppt/revisionInfo.xml><?xml version="1.0" encoding="utf-8"?>
 <p1510:revInfo xmlns:a="http://schemas.openxmlformats.org/drawingml/2006/main" xmlns:r="http://schemas.openxmlformats.org/officeDocument/2006/relationships" xmlns:p1510="http://schemas.microsoft.com/office/powerpoint/2015/10/main">
   <p1510:revLst>
-    <p1510:client id="{5E355D91-986E-4C7B-96C8-B213E2033AFD}" v="1" dt="2021-03-10T00:40:50.513"/>
+    <p1510:client id="{5E355D91-986E-4C7B-96C8-B213E2033AFD}" v="9" dt="2021-03-10T01:17:58.943"/>
   </p1510:revLst>
 </p1510:revInfo>
 </file>
@@ -180,19 +180,191 @@
 <pc:chgInfo xmlns:a="http://schemas.openxmlformats.org/drawingml/2006/main" xmlns:r="http://schemas.openxmlformats.org/officeDocument/2006/relationships" xmlns:ac="http://schemas.microsoft.com/office/drawing/2013/main/command" xmlns:pc="http://schemas.microsoft.com/office/powerpoint/2013/main/command">
   <pc:docChgLst>
     <pc:chgData name="Carl Coffman" userId="395c5dd763efd17d" providerId="LiveId" clId="{5E355D91-986E-4C7B-96C8-B213E2033AFD}"/>
-    <pc:docChg chg="custSel addSld modSld sldOrd">
-      <pc:chgData name="Carl Coffman" userId="395c5dd763efd17d" providerId="LiveId" clId="{5E355D91-986E-4C7B-96C8-B213E2033AFD}" dt="2021-03-10T00:41:30.257" v="44"/>
+    <pc:docChg chg="undo custSel addSld modSld sldOrd">
+      <pc:chgData name="Carl Coffman" userId="395c5dd763efd17d" providerId="LiveId" clId="{5E355D91-986E-4C7B-96C8-B213E2033AFD}" dt="2021-03-10T01:18:37.376" v="416" actId="14100"/>
       <pc:docMkLst>
         <pc:docMk/>
       </pc:docMkLst>
+      <pc:sldChg chg="addSp delSp modSp mod">
+        <pc:chgData name="Carl Coffman" userId="395c5dd763efd17d" providerId="LiveId" clId="{5E355D91-986E-4C7B-96C8-B213E2033AFD}" dt="2021-03-10T01:15:15.509" v="329" actId="255"/>
+        <pc:sldMkLst>
+          <pc:docMk/>
+          <pc:sldMk cId="319056691" sldId="262"/>
+        </pc:sldMkLst>
+        <pc:spChg chg="mod">
+          <ac:chgData name="Carl Coffman" userId="395c5dd763efd17d" providerId="LiveId" clId="{5E355D91-986E-4C7B-96C8-B213E2033AFD}" dt="2021-03-10T01:15:15.509" v="329" actId="255"/>
+          <ac:spMkLst>
+            <pc:docMk/>
+            <pc:sldMk cId="319056691" sldId="262"/>
+            <ac:spMk id="2" creationId="{727FFB98-7050-4567-81EF-5F3D129F901C}"/>
+          </ac:spMkLst>
+        </pc:spChg>
+        <pc:picChg chg="mod">
+          <ac:chgData name="Carl Coffman" userId="395c5dd763efd17d" providerId="LiveId" clId="{5E355D91-986E-4C7B-96C8-B213E2033AFD}" dt="2021-03-10T00:49:42.184" v="110" actId="1076"/>
+          <ac:picMkLst>
+            <pc:docMk/>
+            <pc:sldMk cId="319056691" sldId="262"/>
+            <ac:picMk id="6" creationId="{55CA042D-4A69-4EB9-B242-8EB2B3EDC5AC}"/>
+          </ac:picMkLst>
+        </pc:picChg>
+        <pc:picChg chg="add del mod">
+          <ac:chgData name="Carl Coffman" userId="395c5dd763efd17d" providerId="LiveId" clId="{5E355D91-986E-4C7B-96C8-B213E2033AFD}" dt="2021-03-10T00:49:58.815" v="117" actId="21"/>
+          <ac:picMkLst>
+            <pc:docMk/>
+            <pc:sldMk cId="319056691" sldId="262"/>
+            <ac:picMk id="16" creationId="{935E32E9-A59E-4A5E-9B89-4B9C30D612DC}"/>
+          </ac:picMkLst>
+        </pc:picChg>
+      </pc:sldChg>
+      <pc:sldChg chg="modSp mod">
+        <pc:chgData name="Carl Coffman" userId="395c5dd763efd17d" providerId="LiveId" clId="{5E355D91-986E-4C7B-96C8-B213E2033AFD}" dt="2021-03-10T01:15:49.501" v="335" actId="255"/>
+        <pc:sldMkLst>
+          <pc:docMk/>
+          <pc:sldMk cId="1352665434" sldId="266"/>
+        </pc:sldMkLst>
+        <pc:spChg chg="mod">
+          <ac:chgData name="Carl Coffman" userId="395c5dd763efd17d" providerId="LiveId" clId="{5E355D91-986E-4C7B-96C8-B213E2033AFD}" dt="2021-03-10T01:15:49.501" v="335" actId="255"/>
+          <ac:spMkLst>
+            <pc:docMk/>
+            <pc:sldMk cId="1352665434" sldId="266"/>
+            <ac:spMk id="5" creationId="{D4296CC1-D52C-4736-AB4E-1D2D2C75C616}"/>
+          </ac:spMkLst>
+        </pc:spChg>
+      </pc:sldChg>
+      <pc:sldChg chg="addSp delSp modSp mod">
+        <pc:chgData name="Carl Coffman" userId="395c5dd763efd17d" providerId="LiveId" clId="{5E355D91-986E-4C7B-96C8-B213E2033AFD}" dt="2021-03-10T01:15:27.140" v="330" actId="255"/>
+        <pc:sldMkLst>
+          <pc:docMk/>
+          <pc:sldMk cId="3228446187" sldId="326"/>
+        </pc:sldMkLst>
+        <pc:spChg chg="mod">
+          <ac:chgData name="Carl Coffman" userId="395c5dd763efd17d" providerId="LiveId" clId="{5E355D91-986E-4C7B-96C8-B213E2033AFD}" dt="2021-03-10T01:15:27.140" v="330" actId="255"/>
+          <ac:spMkLst>
+            <pc:docMk/>
+            <pc:sldMk cId="3228446187" sldId="326"/>
+            <ac:spMk id="2" creationId="{727FFB98-7050-4567-81EF-5F3D129F901C}"/>
+          </ac:spMkLst>
+        </pc:spChg>
+        <pc:spChg chg="mod">
+          <ac:chgData name="Carl Coffman" userId="395c5dd763efd17d" providerId="LiveId" clId="{5E355D91-986E-4C7B-96C8-B213E2033AFD}" dt="2021-03-10T00:46:08.272" v="45" actId="14100"/>
+          <ac:spMkLst>
+            <pc:docMk/>
+            <pc:sldMk cId="3228446187" sldId="326"/>
+            <ac:spMk id="19" creationId="{26F04997-C330-4C3B-9DC0-546218AF8388}"/>
+          </ac:spMkLst>
+        </pc:spChg>
+        <pc:picChg chg="add del">
+          <ac:chgData name="Carl Coffman" userId="395c5dd763efd17d" providerId="LiveId" clId="{5E355D91-986E-4C7B-96C8-B213E2033AFD}" dt="2021-03-10T00:46:15.255" v="47" actId="21"/>
+          <ac:picMkLst>
+            <pc:docMk/>
+            <pc:sldMk cId="3228446187" sldId="326"/>
+            <ac:picMk id="5" creationId="{8D448236-E265-4856-98F8-3A95646F6067}"/>
+          </ac:picMkLst>
+        </pc:picChg>
+        <pc:picChg chg="add del mod">
+          <ac:chgData name="Carl Coffman" userId="395c5dd763efd17d" providerId="LiveId" clId="{5E355D91-986E-4C7B-96C8-B213E2033AFD}" dt="2021-03-10T00:50:20.594" v="119" actId="478"/>
+          <ac:picMkLst>
+            <pc:docMk/>
+            <pc:sldMk cId="3228446187" sldId="326"/>
+            <ac:picMk id="8" creationId="{C9312FE7-9EC6-4CAC-AFD8-633917916881}"/>
+          </ac:picMkLst>
+        </pc:picChg>
+        <pc:picChg chg="add del mod">
+          <ac:chgData name="Carl Coffman" userId="395c5dd763efd17d" providerId="LiveId" clId="{5E355D91-986E-4C7B-96C8-B213E2033AFD}" dt="2021-03-10T00:48:14.444" v="64" actId="21"/>
+          <ac:picMkLst>
+            <pc:docMk/>
+            <pc:sldMk cId="3228446187" sldId="326"/>
+            <ac:picMk id="9" creationId="{98ADFD52-A651-481D-BDAC-773148D8D1C6}"/>
+          </ac:picMkLst>
+        </pc:picChg>
+        <pc:picChg chg="add del mod">
+          <ac:chgData name="Carl Coffman" userId="395c5dd763efd17d" providerId="LiveId" clId="{5E355D91-986E-4C7B-96C8-B213E2033AFD}" dt="2021-03-10T00:50:51.261" v="123" actId="21"/>
+          <ac:picMkLst>
+            <pc:docMk/>
+            <pc:sldMk cId="3228446187" sldId="326"/>
+            <ac:picMk id="12" creationId="{3B14AC29-245E-4B82-ADAD-779E8750C51A}"/>
+          </ac:picMkLst>
+        </pc:picChg>
+      </pc:sldChg>
+      <pc:sldChg chg="addSp modSp mod">
+        <pc:chgData name="Carl Coffman" userId="395c5dd763efd17d" providerId="LiveId" clId="{5E355D91-986E-4C7B-96C8-B213E2033AFD}" dt="2021-03-10T01:15:07.113" v="328" actId="255"/>
+        <pc:sldMkLst>
+          <pc:docMk/>
+          <pc:sldMk cId="1234844693" sldId="327"/>
+        </pc:sldMkLst>
+        <pc:spChg chg="mod">
+          <ac:chgData name="Carl Coffman" userId="395c5dd763efd17d" providerId="LiveId" clId="{5E355D91-986E-4C7B-96C8-B213E2033AFD}" dt="2021-03-10T01:15:07.113" v="328" actId="255"/>
+          <ac:spMkLst>
+            <pc:docMk/>
+            <pc:sldMk cId="1234844693" sldId="327"/>
+            <ac:spMk id="2" creationId="{727FFB98-7050-4567-81EF-5F3D129F901C}"/>
+          </ac:spMkLst>
+        </pc:spChg>
+        <pc:spChg chg="mod">
+          <ac:chgData name="Carl Coffman" userId="395c5dd763efd17d" providerId="LiveId" clId="{5E355D91-986E-4C7B-96C8-B213E2033AFD}" dt="2021-03-10T00:50:48.321" v="122" actId="1076"/>
+          <ac:spMkLst>
+            <pc:docMk/>
+            <pc:sldMk cId="1234844693" sldId="327"/>
+            <ac:spMk id="11" creationId="{45702F7B-FD44-4CE8-ACD0-1B11D372421E}"/>
+          </ac:spMkLst>
+        </pc:spChg>
+        <pc:spChg chg="mod">
+          <ac:chgData name="Carl Coffman" userId="395c5dd763efd17d" providerId="LiveId" clId="{5E355D91-986E-4C7B-96C8-B213E2033AFD}" dt="2021-03-10T00:55:12.890" v="309" actId="14100"/>
+          <ac:spMkLst>
+            <pc:docMk/>
+            <pc:sldMk cId="1234844693" sldId="327"/>
+            <ac:spMk id="13" creationId="{A5DE8453-C6E8-423E-B621-DF286B3A12C1}"/>
+          </ac:spMkLst>
+        </pc:spChg>
+        <pc:spChg chg="add mod">
+          <ac:chgData name="Carl Coffman" userId="395c5dd763efd17d" providerId="LiveId" clId="{5E355D91-986E-4C7B-96C8-B213E2033AFD}" dt="2021-03-10T00:54:47.632" v="266" actId="1076"/>
+          <ac:spMkLst>
+            <pc:docMk/>
+            <pc:sldMk cId="1234844693" sldId="327"/>
+            <ac:spMk id="14" creationId="{F466EE8D-3AE8-4750-9A43-7379B335122B}"/>
+          </ac:spMkLst>
+        </pc:spChg>
+        <pc:spChg chg="mod">
+          <ac:chgData name="Carl Coffman" userId="395c5dd763efd17d" providerId="LiveId" clId="{5E355D91-986E-4C7B-96C8-B213E2033AFD}" dt="2021-03-10T00:51:11.608" v="128" actId="1076"/>
+          <ac:spMkLst>
+            <pc:docMk/>
+            <pc:sldMk cId="1234844693" sldId="327"/>
+            <ac:spMk id="27" creationId="{D3C7D977-82B3-4714-8185-4717A8F91FAB}"/>
+          </ac:spMkLst>
+        </pc:spChg>
+        <pc:picChg chg="add mod">
+          <ac:chgData name="Carl Coffman" userId="395c5dd763efd17d" providerId="LiveId" clId="{5E355D91-986E-4C7B-96C8-B213E2033AFD}" dt="2021-03-10T00:54:28.864" v="263" actId="1076"/>
+          <ac:picMkLst>
+            <pc:docMk/>
+            <pc:sldMk cId="1234844693" sldId="327"/>
+            <ac:picMk id="12" creationId="{580C9DE7-7125-4A6C-9001-8C2A9EAE14C3}"/>
+          </ac:picMkLst>
+        </pc:picChg>
+        <pc:picChg chg="mod">
+          <ac:chgData name="Carl Coffman" userId="395c5dd763efd17d" providerId="LiveId" clId="{5E355D91-986E-4C7B-96C8-B213E2033AFD}" dt="2021-03-10T00:52:44.421" v="234" actId="1076"/>
+          <ac:picMkLst>
+            <pc:docMk/>
+            <pc:sldMk cId="1234844693" sldId="327"/>
+            <ac:picMk id="16" creationId="{881328B8-A29D-434B-9CD6-8427F47AC88D}"/>
+          </ac:picMkLst>
+        </pc:picChg>
+        <pc:picChg chg="mod">
+          <ac:chgData name="Carl Coffman" userId="395c5dd763efd17d" providerId="LiveId" clId="{5E355D91-986E-4C7B-96C8-B213E2033AFD}" dt="2021-03-10T00:51:08.569" v="127" actId="1076"/>
+          <ac:picMkLst>
+            <pc:docMk/>
+            <pc:sldMk cId="1234844693" sldId="327"/>
+            <ac:picMk id="24" creationId="{FD9585CA-A313-4DC5-AF7E-29C2E068D8C2}"/>
+          </ac:picMkLst>
+        </pc:picChg>
+      </pc:sldChg>
       <pc:sldChg chg="addSp delSp modSp mod ord">
-        <pc:chgData name="Carl Coffman" userId="395c5dd763efd17d" providerId="LiveId" clId="{5E355D91-986E-4C7B-96C8-B213E2033AFD}" dt="2021-03-10T00:41:30.257" v="44"/>
+        <pc:chgData name="Carl Coffman" userId="395c5dd763efd17d" providerId="LiveId" clId="{5E355D91-986E-4C7B-96C8-B213E2033AFD}" dt="2021-03-10T01:15:43.790" v="334" actId="255"/>
         <pc:sldMkLst>
           <pc:docMk/>
           <pc:sldMk cId="2896842121" sldId="329"/>
         </pc:sldMkLst>
         <pc:spChg chg="mod">
-          <ac:chgData name="Carl Coffman" userId="395c5dd763efd17d" providerId="LiveId" clId="{5E355D91-986E-4C7B-96C8-B213E2033AFD}" dt="2021-03-10T00:41:14.265" v="38" actId="20577"/>
+          <ac:chgData name="Carl Coffman" userId="395c5dd763efd17d" providerId="LiveId" clId="{5E355D91-986E-4C7B-96C8-B213E2033AFD}" dt="2021-03-10T01:15:43.790" v="334" actId="255"/>
           <ac:spMkLst>
             <pc:docMk/>
             <pc:sldMk cId="2896842121" sldId="329"/>
@@ -232,12 +404,123 @@
           </ac:picMkLst>
         </pc:picChg>
       </pc:sldChg>
-      <pc:sldChg chg="delSp add mod">
-        <pc:chgData name="Carl Coffman" userId="395c5dd763efd17d" providerId="LiveId" clId="{5E355D91-986E-4C7B-96C8-B213E2033AFD}" dt="2021-03-10T00:41:27.664" v="42" actId="478"/>
+      <pc:sldChg chg="addSp delSp modSp mod">
+        <pc:chgData name="Carl Coffman" userId="395c5dd763efd17d" providerId="LiveId" clId="{5E355D91-986E-4C7B-96C8-B213E2033AFD}" dt="2021-03-10T01:18:37.376" v="416" actId="14100"/>
+        <pc:sldMkLst>
+          <pc:docMk/>
+          <pc:sldMk cId="1027188180" sldId="330"/>
+        </pc:sldMkLst>
+        <pc:spChg chg="mod">
+          <ac:chgData name="Carl Coffman" userId="395c5dd763efd17d" providerId="LiveId" clId="{5E355D91-986E-4C7B-96C8-B213E2033AFD}" dt="2021-03-10T01:15:32.378" v="332" actId="255"/>
+          <ac:spMkLst>
+            <pc:docMk/>
+            <pc:sldMk cId="1027188180" sldId="330"/>
+            <ac:spMk id="2" creationId="{727FFB98-7050-4567-81EF-5F3D129F901C}"/>
+          </ac:spMkLst>
+        </pc:spChg>
+        <pc:spChg chg="mod">
+          <ac:chgData name="Carl Coffman" userId="395c5dd763efd17d" providerId="LiveId" clId="{5E355D91-986E-4C7B-96C8-B213E2033AFD}" dt="2021-03-10T01:17:46.120" v="397" actId="20577"/>
+          <ac:spMkLst>
+            <pc:docMk/>
+            <pc:sldMk cId="1027188180" sldId="330"/>
+            <ac:spMk id="13" creationId="{071892E6-0191-4F95-AA99-95387EC76C20}"/>
+          </ac:spMkLst>
+        </pc:spChg>
+        <pc:spChg chg="add mod">
+          <ac:chgData name="Carl Coffman" userId="395c5dd763efd17d" providerId="LiveId" clId="{5E355D91-986E-4C7B-96C8-B213E2033AFD}" dt="2021-03-10T01:18:11.545" v="404" actId="14100"/>
+          <ac:spMkLst>
+            <pc:docMk/>
+            <pc:sldMk cId="1027188180" sldId="330"/>
+            <ac:spMk id="24" creationId="{0331A4F5-51E3-44E2-A3A9-0114A010C8B4}"/>
+          </ac:spMkLst>
+        </pc:spChg>
+        <pc:spChg chg="mod">
+          <ac:chgData name="Carl Coffman" userId="395c5dd763efd17d" providerId="LiveId" clId="{5E355D91-986E-4C7B-96C8-B213E2033AFD}" dt="2021-03-10T01:18:37.376" v="416" actId="14100"/>
+          <ac:spMkLst>
+            <pc:docMk/>
+            <pc:sldMk cId="1027188180" sldId="330"/>
+            <ac:spMk id="28" creationId="{1A4073E5-0B26-4A43-940E-B776B5E9296E}"/>
+          </ac:spMkLst>
+        </pc:spChg>
+        <pc:picChg chg="mod">
+          <ac:chgData name="Carl Coffman" userId="395c5dd763efd17d" providerId="LiveId" clId="{5E355D91-986E-4C7B-96C8-B213E2033AFD}" dt="2021-03-10T01:18:03.907" v="402" actId="1076"/>
+          <ac:picMkLst>
+            <pc:docMk/>
+            <pc:sldMk cId="1027188180" sldId="330"/>
+            <ac:picMk id="5" creationId="{B6DCB017-138A-44E7-A59C-43E555F0CEDF}"/>
+          </ac:picMkLst>
+        </pc:picChg>
+        <pc:picChg chg="add mod">
+          <ac:chgData name="Carl Coffman" userId="395c5dd763efd17d" providerId="LiveId" clId="{5E355D91-986E-4C7B-96C8-B213E2033AFD}" dt="2021-03-10T00:48:50.056" v="73" actId="1076"/>
+          <ac:picMkLst>
+            <pc:docMk/>
+            <pc:sldMk cId="1027188180" sldId="330"/>
+            <ac:picMk id="6" creationId="{3CCD5961-A598-41FB-8716-40B0BA8C6405}"/>
+          </ac:picMkLst>
+        </pc:picChg>
+        <pc:picChg chg="add mod">
+          <ac:chgData name="Carl Coffman" userId="395c5dd763efd17d" providerId="LiveId" clId="{5E355D91-986E-4C7B-96C8-B213E2033AFD}" dt="2021-03-10T01:17:58.464" v="399" actId="1076"/>
+          <ac:picMkLst>
+            <pc:docMk/>
+            <pc:sldMk cId="1027188180" sldId="330"/>
+            <ac:picMk id="9" creationId="{B48EFA30-6F05-432A-8E8D-EDD82F9F0FA4}"/>
+          </ac:picMkLst>
+        </pc:picChg>
+        <pc:picChg chg="mod">
+          <ac:chgData name="Carl Coffman" userId="395c5dd763efd17d" providerId="LiveId" clId="{5E355D91-986E-4C7B-96C8-B213E2033AFD}" dt="2021-03-10T01:03:20.080" v="321" actId="1076"/>
+          <ac:picMkLst>
+            <pc:docMk/>
+            <pc:sldMk cId="1027188180" sldId="330"/>
+            <ac:picMk id="14" creationId="{47A0D80E-15DD-48DD-99C4-3DD8101090BB}"/>
+          </ac:picMkLst>
+        </pc:picChg>
+        <pc:picChg chg="mod">
+          <ac:chgData name="Carl Coffman" userId="395c5dd763efd17d" providerId="LiveId" clId="{5E355D91-986E-4C7B-96C8-B213E2033AFD}" dt="2021-03-10T00:47:56.408" v="59" actId="1076"/>
+          <ac:picMkLst>
+            <pc:docMk/>
+            <pc:sldMk cId="1027188180" sldId="330"/>
+            <ac:picMk id="17" creationId="{9CC833C7-A79D-4923-BEA8-F991F5687D6A}"/>
+          </ac:picMkLst>
+        </pc:picChg>
+        <pc:picChg chg="add del mod">
+          <ac:chgData name="Carl Coffman" userId="395c5dd763efd17d" providerId="LiveId" clId="{5E355D91-986E-4C7B-96C8-B213E2033AFD}" dt="2021-03-10T00:46:24.524" v="50" actId="21"/>
+          <ac:picMkLst>
+            <pc:docMk/>
+            <pc:sldMk cId="1027188180" sldId="330"/>
+            <ac:picMk id="20" creationId="{EA4F91FE-5B5E-4825-879F-4D9BEF9D9316}"/>
+          </ac:picMkLst>
+        </pc:picChg>
+        <pc:picChg chg="add mod">
+          <ac:chgData name="Carl Coffman" userId="395c5dd763efd17d" providerId="LiveId" clId="{5E355D91-986E-4C7B-96C8-B213E2033AFD}" dt="2021-03-10T00:48:50.056" v="73" actId="1076"/>
+          <ac:picMkLst>
+            <pc:docMk/>
+            <pc:sldMk cId="1027188180" sldId="330"/>
+            <ac:picMk id="23" creationId="{E2AC1AB5-CAAA-4152-8F23-6E9FC44D40E1}"/>
+          </ac:picMkLst>
+        </pc:picChg>
+        <pc:picChg chg="del mod">
+          <ac:chgData name="Carl Coffman" userId="395c5dd763efd17d" providerId="LiveId" clId="{5E355D91-986E-4C7B-96C8-B213E2033AFD}" dt="2021-03-10T00:49:17.488" v="103" actId="21"/>
+          <ac:picMkLst>
+            <pc:docMk/>
+            <pc:sldMk cId="1027188180" sldId="330"/>
+            <ac:picMk id="29" creationId="{AA545E52-1E1E-4A31-A687-75EE75F5668E}"/>
+          </ac:picMkLst>
+        </pc:picChg>
+      </pc:sldChg>
+      <pc:sldChg chg="delSp modSp add mod">
+        <pc:chgData name="Carl Coffman" userId="395c5dd763efd17d" providerId="LiveId" clId="{5E355D91-986E-4C7B-96C8-B213E2033AFD}" dt="2021-03-10T01:15:38.418" v="333" actId="255"/>
         <pc:sldMkLst>
           <pc:docMk/>
           <pc:sldMk cId="501622959" sldId="331"/>
         </pc:sldMkLst>
+        <pc:spChg chg="mod">
+          <ac:chgData name="Carl Coffman" userId="395c5dd763efd17d" providerId="LiveId" clId="{5E355D91-986E-4C7B-96C8-B213E2033AFD}" dt="2021-03-10T01:15:38.418" v="333" actId="255"/>
+          <ac:spMkLst>
+            <pc:docMk/>
+            <pc:sldMk cId="501622959" sldId="331"/>
+            <ac:spMk id="2" creationId="{727FFB98-7050-4567-81EF-5F3D129F901C}"/>
+          </ac:spMkLst>
+        </pc:spChg>
         <pc:picChg chg="del">
           <ac:chgData name="Carl Coffman" userId="395c5dd763efd17d" providerId="LiveId" clId="{5E355D91-986E-4C7B-96C8-B213E2033AFD}" dt="2021-03-10T00:41:27.664" v="42" actId="478"/>
           <ac:picMkLst>
@@ -4951,7 +5234,7 @@
           <a:lstStyle/>
           <a:p>
             <a:r>
-              <a:rPr lang="en-US" dirty="0"/>
+              <a:rPr lang="en-US" sz="4000" dirty="0"/>
               <a:t>Final Project - Stocks</a:t>
             </a:r>
           </a:p>
@@ -5815,7 +6098,7 @@
         </p:blipFill>
         <p:spPr>
           <a:xfrm>
-            <a:off x="7291321" y="1793179"/>
+            <a:off x="7291319" y="1906289"/>
             <a:ext cx="847857" cy="323850"/>
           </a:xfrm>
           <a:prstGeom prst="rect">
@@ -6483,7 +6766,7 @@
           <a:lstStyle/>
           <a:p>
             <a:r>
-              <a:rPr lang="en-US" dirty="0"/>
+              <a:rPr lang="en-US" sz="4000" dirty="0"/>
               <a:t>Social Media and Cloud Data</a:t>
             </a:r>
           </a:p>
@@ -6507,7 +6790,7 @@
         </p:nvSpPr>
         <p:spPr>
           <a:xfrm>
-            <a:off x="3797299" y="956255"/>
+            <a:off x="3605239" y="956255"/>
             <a:ext cx="3340101" cy="479822"/>
           </a:xfrm>
         </p:spPr>
@@ -6542,8 +6825,8 @@
         </p:nvSpPr>
         <p:spPr>
           <a:xfrm>
-            <a:off x="3454399" y="1419506"/>
-            <a:ext cx="4260850" cy="1018894"/>
+            <a:off x="3147105" y="1459152"/>
+            <a:ext cx="3259032" cy="1200475"/>
           </a:xfrm>
         </p:spPr>
         <p:txBody>
@@ -6554,34 +6837,14 @@
           <a:p>
             <a:r>
               <a:rPr lang="en-US" sz="1100" dirty="0"/>
-              <a:t>No historical warehouse for social media</a:t>
+              <a:t>No significant, historical warehouse for social media data.</a:t>
             </a:r>
           </a:p>
           <a:p>
             <a:r>
               <a:rPr lang="en-US" sz="1100" dirty="0"/>
-              <a:t>Finding “free” historical data source for a particular stock’s short activity – current (.info) and </a:t>
-            </a:r>
-            <a:r>
-              <a:rPr lang="en-US" sz="1100" dirty="0" err="1"/>
-              <a:t>baic</a:t>
-            </a:r>
-            <a:r>
-              <a:rPr lang="en-US" sz="1100" dirty="0"/>
-              <a:t>-historical (.history) is made available: open, close, volume, high, low social activity or amount of noise and its trend.</a:t>
-            </a:r>
-          </a:p>
-          <a:p>
-            <a:pPr marL="0" indent="0">
-              <a:buNone/>
-            </a:pPr>
-            <a:r>
-              <a:rPr lang="en-US" sz="1100" dirty="0"/>
-              <a:t> </a:t>
-            </a:r>
-          </a:p>
-          <a:p>
-            <a:endParaRPr lang="en-US" sz="1100" dirty="0"/>
+              <a:t>Finding “free” historical data source for a particular stock’s short activity – current (.info) and basic-historical is made available; Open, High, Low, Close, Volume</a:t>
+            </a:r>
           </a:p>
         </p:txBody>
       </p:sp>
@@ -6739,7 +7002,7 @@
         </p:blipFill>
         <p:spPr>
           <a:xfrm>
-            <a:off x="5275290" y="2813443"/>
+            <a:off x="5194300" y="2904532"/>
             <a:ext cx="3259108" cy="1801405"/>
           </a:xfrm>
           <a:prstGeom prst="rect">
@@ -7195,7 +7458,7 @@
         </p:nvSpPr>
         <p:spPr>
           <a:xfrm>
-            <a:off x="5194300" y="2323360"/>
+            <a:off x="5143501" y="2445763"/>
             <a:ext cx="3543299" cy="547066"/>
           </a:xfrm>
           <a:prstGeom prst="rect">
@@ -7419,6 +7682,90 @@
               <a:buNone/>
             </a:pPr>
             <a:endParaRPr lang="en-US" sz="1100" dirty="0"/>
+          </a:p>
+        </p:txBody>
+      </p:sp>
+      <p:pic>
+        <p:nvPicPr>
+          <p:cNvPr id="12" name="Picture 11">
+            <a:extLst>
+              <a:ext uri="{FF2B5EF4-FFF2-40B4-BE49-F238E27FC236}">
+                <a16:creationId xmlns:a16="http://schemas.microsoft.com/office/drawing/2014/main" id="{580C9DE7-7125-4A6C-9001-8C2A9EAE14C3}"/>
+              </a:ext>
+            </a:extLst>
+          </p:cNvPr>
+          <p:cNvPicPr>
+            <a:picLocks noChangeAspect="1"/>
+          </p:cNvPicPr>
+          <p:nvPr/>
+        </p:nvPicPr>
+        <p:blipFill>
+          <a:blip r:embed="rId9"/>
+          <a:stretch>
+            <a:fillRect/>
+          </a:stretch>
+        </p:blipFill>
+        <p:spPr>
+          <a:xfrm>
+            <a:off x="6406137" y="1521998"/>
+            <a:ext cx="2333767" cy="876299"/>
+          </a:xfrm>
+          <a:prstGeom prst="rect">
+            <a:avLst/>
+          </a:prstGeom>
+          <a:ln>
+            <a:noFill/>
+          </a:ln>
+          <a:effectLst>
+            <a:outerShdw blurRad="190500" algn="tl" rotWithShape="0">
+              <a:srgbClr val="000000">
+                <a:alpha val="70000"/>
+              </a:srgbClr>
+            </a:outerShdw>
+          </a:effectLst>
+        </p:spPr>
+      </p:pic>
+      <p:sp>
+        <p:nvSpPr>
+          <p:cNvPr id="14" name="Arrow: Right 13">
+            <a:extLst>
+              <a:ext uri="{FF2B5EF4-FFF2-40B4-BE49-F238E27FC236}">
+                <a16:creationId xmlns:a16="http://schemas.microsoft.com/office/drawing/2014/main" id="{F466EE8D-3AE8-4750-9A43-7379B335122B}"/>
+              </a:ext>
+            </a:extLst>
+          </p:cNvPr>
+          <p:cNvSpPr/>
+          <p:nvPr/>
+        </p:nvSpPr>
+        <p:spPr>
+          <a:xfrm>
+            <a:off x="5827740" y="2164664"/>
+            <a:ext cx="578397" cy="255933"/>
+          </a:xfrm>
+          <a:prstGeom prst="rightArrow">
+            <a:avLst/>
+          </a:prstGeom>
+        </p:spPr>
+        <p:style>
+          <a:lnRef idx="1">
+            <a:schemeClr val="accent1"/>
+          </a:lnRef>
+          <a:fillRef idx="3">
+            <a:schemeClr val="accent1"/>
+          </a:fillRef>
+          <a:effectRef idx="2">
+            <a:schemeClr val="accent1"/>
+          </a:effectRef>
+          <a:fontRef idx="minor">
+            <a:schemeClr val="lt1"/>
+          </a:fontRef>
+        </p:style>
+        <p:txBody>
+          <a:bodyPr rtlCol="0" anchor="ctr"/>
+          <a:lstStyle/>
+          <a:p>
+            <a:pPr algn="ctr"/>
+            <a:endParaRPr lang="en-US"/>
           </a:p>
         </p:txBody>
       </p:sp>
@@ -7481,7 +7828,7 @@
           <a:lstStyle/>
           <a:p>
             <a:r>
-              <a:rPr lang="en-US" dirty="0"/>
+              <a:rPr lang="en-US" sz="4000" dirty="0"/>
               <a:t>Libraries Used</a:t>
             </a:r>
           </a:p>
@@ -8068,8 +8415,8 @@
         </p:nvSpPr>
         <p:spPr>
           <a:xfrm>
-            <a:off x="3975100" y="1331706"/>
-            <a:ext cx="4799013" cy="2648847"/>
+            <a:off x="3975100" y="1331707"/>
+            <a:ext cx="4799013" cy="2427494"/>
           </a:xfrm>
           <a:prstGeom prst="rect">
             <a:avLst/>
@@ -8999,7 +9346,7 @@
         </p:nvSpPr>
         <p:spPr>
           <a:xfrm>
-            <a:off x="457200" y="205979"/>
+            <a:off x="464138" y="205979"/>
             <a:ext cx="8229600" cy="857250"/>
           </a:xfrm>
         </p:spPr>
@@ -9010,8 +9357,8 @@
           <a:lstStyle/>
           <a:p>
             <a:r>
-              <a:rPr lang="en-US" dirty="0"/>
-              <a:t>ARIMA Model</a:t>
+              <a:rPr lang="en-US" sz="4000" dirty="0"/>
+              <a:t>ARIMA / Linear Regression</a:t>
             </a:r>
           </a:p>
         </p:txBody>
@@ -9443,8 +9790,8 @@
         </p:nvSpPr>
         <p:spPr>
           <a:xfrm>
-            <a:off x="469580" y="1319531"/>
-            <a:ext cx="1650247" cy="707886"/>
+            <a:off x="412162" y="996041"/>
+            <a:ext cx="1950038" cy="707886"/>
           </a:xfrm>
           <a:prstGeom prst="rect">
             <a:avLst/>
@@ -9475,7 +9822,19 @@
                 <a:effectLst/>
                 <a:latin typeface="charter"/>
               </a:rPr>
-              <a:t> is going to be a good model to be applied to this type of data (there is auto-correlation in the data).</a:t>
+              <a:t> (or Box-Jenkins method)</a:t>
+            </a:r>
+          </a:p>
+          <a:p>
+            <a:r>
+              <a:rPr lang="en-US" sz="1000" b="0" i="0" dirty="0">
+                <a:solidFill>
+                  <a:srgbClr val="292929"/>
+                </a:solidFill>
+                <a:effectLst/>
+                <a:latin typeface="charter"/>
+              </a:rPr>
+              <a:t>is a good model to be applied to this type of data (there is auto-correlation in the data).</a:t>
             </a:r>
             <a:endParaRPr lang="en-US" sz="1000" dirty="0"/>
           </a:p>
@@ -9546,8 +9905,8 @@
         </p:blipFill>
         <p:spPr>
           <a:xfrm>
-            <a:off x="4869390" y="2044873"/>
-            <a:ext cx="3378144" cy="2399648"/>
+            <a:off x="4869390" y="2079720"/>
+            <a:ext cx="3297578" cy="2342418"/>
           </a:xfrm>
           <a:prstGeom prst="rect">
             <a:avLst/>
@@ -9959,8 +10318,8 @@
         </p:blipFill>
         <p:spPr>
           <a:xfrm>
-            <a:off x="2204999" y="1031830"/>
-            <a:ext cx="2367001" cy="1517209"/>
+            <a:off x="2453681" y="1125403"/>
+            <a:ext cx="2273945" cy="1457562"/>
           </a:xfrm>
           <a:prstGeom prst="rect">
             <a:avLst/>
@@ -9994,7 +10353,7 @@
         <p:spPr>
           <a:xfrm>
             <a:off x="1125705" y="3859941"/>
-            <a:ext cx="2352037" cy="239053"/>
+            <a:ext cx="2913591" cy="239053"/>
           </a:xfrm>
           <a:prstGeom prst="rect">
             <a:avLst/>
@@ -10151,7 +10510,7 @@
                 <a:latin typeface="Arial" panose="020B0604020202020204" pitchFamily="34" charset="0"/>
                 <a:cs typeface="Arial" panose="020B0604020202020204" pitchFamily="34" charset="0"/>
               </a:rPr>
-              <a:t> 	p=4 lags, d=1 (not stationary)</a:t>
+              <a:t> 	order: p=4 lags, d=1 (not stationary)</a:t>
             </a:r>
             <a:endParaRPr lang="en-US" sz="900" dirty="0">
               <a:latin typeface="Arial" panose="020B0604020202020204" pitchFamily="34" charset="0"/>
@@ -10162,10 +10521,10 @@
       </p:sp>
       <p:pic>
         <p:nvPicPr>
-          <p:cNvPr id="29" name="Picture 28">
+          <p:cNvPr id="6" name="Picture 5">
             <a:extLst>
               <a:ext uri="{FF2B5EF4-FFF2-40B4-BE49-F238E27FC236}">
-                <a16:creationId xmlns:a16="http://schemas.microsoft.com/office/drawing/2014/main" id="{AA545E52-1E1E-4A31-A687-75EE75F5668E}"/>
+                <a16:creationId xmlns:a16="http://schemas.microsoft.com/office/drawing/2014/main" id="{3CCD5961-A598-41FB-8716-40B0BA8C6405}"/>
               </a:ext>
             </a:extLst>
           </p:cNvPr>
@@ -10182,8 +10541,8 @@
         </p:blipFill>
         <p:spPr>
           <a:xfrm>
-            <a:off x="5718077" y="1028399"/>
-            <a:ext cx="2529457" cy="949777"/>
+            <a:off x="4869390" y="1141687"/>
+            <a:ext cx="3241675" cy="780200"/>
           </a:xfrm>
           <a:prstGeom prst="rect">
             <a:avLst/>
@@ -10200,6 +10559,120 @@
           </a:effectLst>
         </p:spPr>
       </p:pic>
+      <p:pic>
+        <p:nvPicPr>
+          <p:cNvPr id="23" name="Picture 22">
+            <a:extLst>
+              <a:ext uri="{FF2B5EF4-FFF2-40B4-BE49-F238E27FC236}">
+                <a16:creationId xmlns:a16="http://schemas.microsoft.com/office/drawing/2014/main" id="{E2AC1AB5-CAAA-4152-8F23-6E9FC44D40E1}"/>
+              </a:ext>
+            </a:extLst>
+          </p:cNvPr>
+          <p:cNvPicPr>
+            <a:picLocks noChangeAspect="1"/>
+          </p:cNvPicPr>
+          <p:nvPr/>
+        </p:nvPicPr>
+        <p:blipFill>
+          <a:blip r:embed="rId9"/>
+          <a:stretch>
+            <a:fillRect/>
+          </a:stretch>
+        </p:blipFill>
+        <p:spPr>
+          <a:xfrm>
+            <a:off x="5188477" y="1632608"/>
+            <a:ext cx="1766132" cy="253473"/>
+          </a:xfrm>
+          <a:prstGeom prst="rect">
+            <a:avLst/>
+          </a:prstGeom>
+        </p:spPr>
+      </p:pic>
+      <p:pic>
+        <p:nvPicPr>
+          <p:cNvPr id="9" name="Picture 8">
+            <a:extLst>
+              <a:ext uri="{FF2B5EF4-FFF2-40B4-BE49-F238E27FC236}">
+                <a16:creationId xmlns:a16="http://schemas.microsoft.com/office/drawing/2014/main" id="{B48EFA30-6F05-432A-8E8D-EDD82F9F0FA4}"/>
+              </a:ext>
+            </a:extLst>
+          </p:cNvPr>
+          <p:cNvPicPr>
+            <a:picLocks noChangeAspect="1"/>
+          </p:cNvPicPr>
+          <p:nvPr/>
+        </p:nvPicPr>
+        <p:blipFill>
+          <a:blip r:embed="rId10"/>
+          <a:stretch>
+            <a:fillRect/>
+          </a:stretch>
+        </p:blipFill>
+        <p:spPr>
+          <a:xfrm>
+            <a:off x="173365" y="1802013"/>
+            <a:ext cx="2175243" cy="652966"/>
+          </a:xfrm>
+          <a:prstGeom prst="rect">
+            <a:avLst/>
+          </a:prstGeom>
+          <a:ln>
+            <a:noFill/>
+          </a:ln>
+          <a:effectLst>
+            <a:outerShdw blurRad="190500" algn="tl" rotWithShape="0">
+              <a:srgbClr val="000000">
+                <a:alpha val="70000"/>
+              </a:srgbClr>
+            </a:outerShdw>
+          </a:effectLst>
+        </p:spPr>
+      </p:pic>
+      <p:sp>
+        <p:nvSpPr>
+          <p:cNvPr id="24" name="Arrow: Right 23">
+            <a:extLst>
+              <a:ext uri="{FF2B5EF4-FFF2-40B4-BE49-F238E27FC236}">
+                <a16:creationId xmlns:a16="http://schemas.microsoft.com/office/drawing/2014/main" id="{0331A4F5-51E3-44E2-A3A9-0114A010C8B4}"/>
+              </a:ext>
+            </a:extLst>
+          </p:cNvPr>
+          <p:cNvSpPr/>
+          <p:nvPr/>
+        </p:nvSpPr>
+        <p:spPr>
+          <a:xfrm>
+            <a:off x="1757857" y="1457169"/>
+            <a:ext cx="746107" cy="255933"/>
+          </a:xfrm>
+          <a:prstGeom prst="rightArrow">
+            <a:avLst/>
+          </a:prstGeom>
+        </p:spPr>
+        <p:style>
+          <a:lnRef idx="1">
+            <a:schemeClr val="accent1"/>
+          </a:lnRef>
+          <a:fillRef idx="3">
+            <a:schemeClr val="accent1"/>
+          </a:fillRef>
+          <a:effectRef idx="2">
+            <a:schemeClr val="accent1"/>
+          </a:effectRef>
+          <a:fontRef idx="minor">
+            <a:schemeClr val="lt1"/>
+          </a:fontRef>
+        </p:style>
+        <p:txBody>
+          <a:bodyPr rtlCol="0" anchor="ctr"/>
+          <a:lstStyle/>
+          <a:p>
+            <a:pPr algn="ctr"/>
+            <a:endParaRPr lang="en-US"/>
+          </a:p>
+        </p:txBody>
+      </p:sp>
     </p:spTree>
     <p:extLst>
       <p:ext uri="{BB962C8B-B14F-4D97-AF65-F5344CB8AC3E}">
@@ -10259,7 +10732,7 @@
           <a:lstStyle/>
           <a:p>
             <a:r>
-              <a:rPr lang="en-US" dirty="0"/>
+              <a:rPr lang="en-US" sz="4000" dirty="0"/>
               <a:t>Reddit Data</a:t>
             </a:r>
           </a:p>
@@ -10496,7 +10969,7 @@
           <a:lstStyle/>
           <a:p>
             <a:r>
-              <a:rPr lang="en-US" dirty="0"/>
+              <a:rPr lang="en-US" sz="4000" dirty="0"/>
               <a:t>Stock Predictor Web Page</a:t>
             </a:r>
           </a:p>
@@ -10642,11 +11115,13 @@
         </p:nvSpPr>
         <p:spPr/>
         <p:txBody>
-          <a:bodyPr/>
+          <a:bodyPr>
+            <a:normAutofit/>
+          </a:bodyPr>
           <a:lstStyle/>
           <a:p>
             <a:r>
-              <a:rPr lang="en-US" dirty="0"/>
+              <a:rPr lang="en-US" sz="4000" dirty="0"/>
               <a:t>Potential Next Steps</a:t>
             </a:r>
           </a:p>

</xml_diff>